<commit_message>
add tdd-bowling-kata example on java with spock framework
</commit_message>
<xml_diff>
--- a/Test Driven Development/materials/pptx/7. TDD-BDD.pptx
+++ b/Test Driven Development/materials/pptx/7. TDD-BDD.pptx
@@ -19767,9 +19767,16 @@
             <p:ph type="title"/>
           </p:nvPr>
         </p:nvSpPr>
-        <p:spPr/>
-        <p:txBody>
-          <a:bodyPr/>
+        <p:spPr>
+          <a:xfrm>
+            <a:off x="3886200" y="2427157"/>
+            <a:ext cx="4862264" cy="1752957"/>
+          </a:xfrm>
+        </p:spPr>
+        <p:txBody>
+          <a:bodyPr>
+            <a:normAutofit/>
+          </a:bodyPr>
           <a:lstStyle/>
           <a:p>
             <a:r>
@@ -19790,10 +19797,16 @@
               </a:rPr>
             </a:br>
             <a:r>
+              <a:rPr lang="en-US" dirty="0">
+                <a:latin typeface="Arial" charset="0"/>
+              </a:rPr>
+              <a:t> </a:t>
+            </a:r>
+            <a:r>
               <a:rPr lang="en-US" dirty="0" smtClean="0">
                 <a:latin typeface="Arial" charset="0"/>
               </a:rPr>
-              <a:t>Integration Tests</a:t>
+              <a:t>BDD</a:t>
             </a:r>
             <a:endParaRPr lang="en-US" dirty="0"/>
           </a:p>
@@ -19820,8 +19833,9 @@
             </a:r>
             <a:r>
               <a:rPr lang="en-US" dirty="0"/>
-              <a:t>3</a:t>
-            </a:r>
+              <a:t>7</a:t>
+            </a:r>
+            <a:endParaRPr lang="en-US" dirty="0"/>
           </a:p>
         </p:txBody>
       </p:sp>
@@ -19895,11 +19909,11 @@
   <p:clrMapOvr>
     <a:masterClrMapping/>
   </p:clrMapOvr>
-  <mc:AlternateContent xmlns:mc="http://schemas.openxmlformats.org/markup-compatibility/2006">
-    <mc:Choice xmlns:p14="http://schemas.microsoft.com/office/powerpoint/2010/main" Requires="p14">
+  <mc:AlternateContent xmlns:mc="http://schemas.openxmlformats.org/markup-compatibility/2006" xmlns:p14="http://schemas.microsoft.com/office/powerpoint/2010/main">
+    <mc:Choice Requires="p14">
       <p:transition p14:dur="0"/>
     </mc:Choice>
-    <mc:Fallback>
+    <mc:Fallback xmlns="">
       <p:transition xmlns:p14="http://schemas.microsoft.com/office/powerpoint/2010/main"/>
     </mc:Fallback>
   </mc:AlternateContent>
@@ -20347,11 +20361,11 @@
   <p:clrMapOvr>
     <a:masterClrMapping/>
   </p:clrMapOvr>
-  <mc:AlternateContent xmlns:mc="http://schemas.openxmlformats.org/markup-compatibility/2006">
-    <mc:Choice xmlns:p14="http://schemas.microsoft.com/office/powerpoint/2010/main" Requires="p14">
+  <mc:AlternateContent xmlns:mc="http://schemas.openxmlformats.org/markup-compatibility/2006" xmlns:p14="http://schemas.microsoft.com/office/powerpoint/2010/main">
+    <mc:Choice Requires="p14">
       <p:transition p14:dur="0"/>
     </mc:Choice>
-    <mc:Fallback>
+    <mc:Fallback xmlns="">
       <p:transition xmlns:p14="http://schemas.microsoft.com/office/powerpoint/2010/main"/>
     </mc:Fallback>
   </mc:AlternateContent>
@@ -20488,11 +20502,11 @@
   <p:clrMapOvr>
     <a:masterClrMapping/>
   </p:clrMapOvr>
-  <mc:AlternateContent xmlns:mc="http://schemas.openxmlformats.org/markup-compatibility/2006">
-    <mc:Choice xmlns:p14="http://schemas.microsoft.com/office/powerpoint/2010/main" Requires="p14">
+  <mc:AlternateContent xmlns:mc="http://schemas.openxmlformats.org/markup-compatibility/2006" xmlns:p14="http://schemas.microsoft.com/office/powerpoint/2010/main">
+    <mc:Choice Requires="p14">
       <p:transition p14:dur="0"/>
     </mc:Choice>
-    <mc:Fallback>
+    <mc:Fallback xmlns="">
       <p:transition xmlns:p14="http://schemas.microsoft.com/office/powerpoint/2010/main"/>
     </mc:Fallback>
   </mc:AlternateContent>
@@ -20559,11 +20573,11 @@
   <p:clrMapOvr>
     <a:masterClrMapping/>
   </p:clrMapOvr>
-  <mc:AlternateContent xmlns:mc="http://schemas.openxmlformats.org/markup-compatibility/2006">
-    <mc:Choice xmlns:p14="http://schemas.microsoft.com/office/powerpoint/2010/main" Requires="p14">
+  <mc:AlternateContent xmlns:mc="http://schemas.openxmlformats.org/markup-compatibility/2006" xmlns:p14="http://schemas.microsoft.com/office/powerpoint/2010/main">
+    <mc:Choice Requires="p14">
       <p:transition p14:dur="0"/>
     </mc:Choice>
-    <mc:Fallback>
+    <mc:Fallback xmlns="">
       <p:transition xmlns:p14="http://schemas.microsoft.com/office/powerpoint/2010/main"/>
     </mc:Fallback>
   </mc:AlternateContent>
@@ -20700,11 +20714,11 @@
   <p:clrMapOvr>
     <a:masterClrMapping/>
   </p:clrMapOvr>
-  <mc:AlternateContent xmlns:mc="http://schemas.openxmlformats.org/markup-compatibility/2006">
-    <mc:Choice xmlns:p14="http://schemas.microsoft.com/office/powerpoint/2010/main" Requires="p14">
+  <mc:AlternateContent xmlns:mc="http://schemas.openxmlformats.org/markup-compatibility/2006" xmlns:p14="http://schemas.microsoft.com/office/powerpoint/2010/main">
+    <mc:Choice Requires="p14">
       <p:transition p14:dur="0"/>
     </mc:Choice>
-    <mc:Fallback>
+    <mc:Fallback xmlns="">
       <p:transition xmlns:p14="http://schemas.microsoft.com/office/powerpoint/2010/main"/>
     </mc:Fallback>
   </mc:AlternateContent>
@@ -20854,11 +20868,11 @@
   <p:clrMapOvr>
     <a:masterClrMapping/>
   </p:clrMapOvr>
-  <mc:AlternateContent xmlns:mc="http://schemas.openxmlformats.org/markup-compatibility/2006">
-    <mc:Choice xmlns:p14="http://schemas.microsoft.com/office/powerpoint/2010/main" Requires="p14">
+  <mc:AlternateContent xmlns:mc="http://schemas.openxmlformats.org/markup-compatibility/2006" xmlns:p14="http://schemas.microsoft.com/office/powerpoint/2010/main">
+    <mc:Choice Requires="p14">
       <p:transition p14:dur="0"/>
     </mc:Choice>
-    <mc:Fallback>
+    <mc:Fallback xmlns="">
       <p:transition xmlns:p14="http://schemas.microsoft.com/office/powerpoint/2010/main"/>
     </mc:Fallback>
   </mc:AlternateContent>
@@ -21024,11 +21038,11 @@
   <p:clrMapOvr>
     <a:masterClrMapping/>
   </p:clrMapOvr>
-  <mc:AlternateContent xmlns:mc="http://schemas.openxmlformats.org/markup-compatibility/2006">
-    <mc:Choice xmlns:p14="http://schemas.microsoft.com/office/powerpoint/2010/main" Requires="p14">
+  <mc:AlternateContent xmlns:mc="http://schemas.openxmlformats.org/markup-compatibility/2006" xmlns:p14="http://schemas.microsoft.com/office/powerpoint/2010/main">
+    <mc:Choice Requires="p14">
       <p:transition p14:dur="0"/>
     </mc:Choice>
-    <mc:Fallback>
+    <mc:Fallback xmlns="">
       <p:transition xmlns:p14="http://schemas.microsoft.com/office/powerpoint/2010/main"/>
     </mc:Fallback>
   </mc:AlternateContent>
@@ -21318,11 +21332,11 @@
   <p:clrMapOvr>
     <a:masterClrMapping/>
   </p:clrMapOvr>
-  <mc:AlternateContent xmlns:mc="http://schemas.openxmlformats.org/markup-compatibility/2006">
-    <mc:Choice xmlns:p14="http://schemas.microsoft.com/office/powerpoint/2010/main" Requires="p14">
+  <mc:AlternateContent xmlns:mc="http://schemas.openxmlformats.org/markup-compatibility/2006" xmlns:p14="http://schemas.microsoft.com/office/powerpoint/2010/main">
+    <mc:Choice Requires="p14">
       <p:transition p14:dur="0"/>
     </mc:Choice>
-    <mc:Fallback>
+    <mc:Fallback xmlns="">
       <p:transition xmlns:p14="http://schemas.microsoft.com/office/powerpoint/2010/main"/>
     </mc:Fallback>
   </mc:AlternateContent>
@@ -21925,11 +21939,11 @@
   <p:clrMapOvr>
     <a:masterClrMapping/>
   </p:clrMapOvr>
-  <mc:AlternateContent xmlns:mc="http://schemas.openxmlformats.org/markup-compatibility/2006">
-    <mc:Choice xmlns:p14="http://schemas.microsoft.com/office/powerpoint/2010/main" Requires="p14">
+  <mc:AlternateContent xmlns:mc="http://schemas.openxmlformats.org/markup-compatibility/2006" xmlns:p14="http://schemas.microsoft.com/office/powerpoint/2010/main">
+    <mc:Choice Requires="p14">
       <p:transition p14:dur="0"/>
     </mc:Choice>
-    <mc:Fallback>
+    <mc:Fallback xmlns="">
       <p:transition xmlns:p14="http://schemas.microsoft.com/office/powerpoint/2010/main"/>
     </mc:Fallback>
   </mc:AlternateContent>
@@ -23372,11 +23386,11 @@
   <p:clrMapOvr>
     <a:masterClrMapping/>
   </p:clrMapOvr>
-  <mc:AlternateContent xmlns:mc="http://schemas.openxmlformats.org/markup-compatibility/2006">
-    <mc:Choice xmlns:p14="http://schemas.microsoft.com/office/powerpoint/2010/main" Requires="p14">
+  <mc:AlternateContent xmlns:mc="http://schemas.openxmlformats.org/markup-compatibility/2006" xmlns:p14="http://schemas.microsoft.com/office/powerpoint/2010/main">
+    <mc:Choice Requires="p14">
       <p:transition p14:dur="0"/>
     </mc:Choice>
-    <mc:Fallback>
+    <mc:Fallback xmlns="">
       <p:transition xmlns:p14="http://schemas.microsoft.com/office/powerpoint/2010/main"/>
     </mc:Fallback>
   </mc:AlternateContent>
@@ -23504,11 +23518,11 @@
   <p:clrMapOvr>
     <a:masterClrMapping/>
   </p:clrMapOvr>
-  <mc:AlternateContent xmlns:mc="http://schemas.openxmlformats.org/markup-compatibility/2006">
-    <mc:Choice xmlns:p14="http://schemas.microsoft.com/office/powerpoint/2010/main" Requires="p14">
+  <mc:AlternateContent xmlns:mc="http://schemas.openxmlformats.org/markup-compatibility/2006" xmlns:p14="http://schemas.microsoft.com/office/powerpoint/2010/main">
+    <mc:Choice Requires="p14">
       <p:transition p14:dur="0"/>
     </mc:Choice>
-    <mc:Fallback>
+    <mc:Fallback xmlns="">
       <p:transition xmlns:p14="http://schemas.microsoft.com/office/powerpoint/2010/main"/>
     </mc:Fallback>
   </mc:AlternateContent>
@@ -25475,11 +25489,11 @@
   <p:clrMapOvr>
     <a:masterClrMapping/>
   </p:clrMapOvr>
-  <mc:AlternateContent xmlns:mc="http://schemas.openxmlformats.org/markup-compatibility/2006">
-    <mc:Choice xmlns:p14="http://schemas.microsoft.com/office/powerpoint/2010/main" Requires="p14">
+  <mc:AlternateContent xmlns:mc="http://schemas.openxmlformats.org/markup-compatibility/2006" xmlns:p14="http://schemas.microsoft.com/office/powerpoint/2010/main">
+    <mc:Choice Requires="p14">
       <p:transition p14:dur="0"/>
     </mc:Choice>
-    <mc:Fallback>
+    <mc:Fallback xmlns="">
       <p:transition xmlns:p14="http://schemas.microsoft.com/office/powerpoint/2010/main"/>
     </mc:Fallback>
   </mc:AlternateContent>
@@ -25548,11 +25562,11 @@
   <p:clrMapOvr>
     <a:masterClrMapping/>
   </p:clrMapOvr>
-  <mc:AlternateContent xmlns:mc="http://schemas.openxmlformats.org/markup-compatibility/2006">
-    <mc:Choice xmlns:p14="http://schemas.microsoft.com/office/powerpoint/2010/main" Requires="p14">
+  <mc:AlternateContent xmlns:mc="http://schemas.openxmlformats.org/markup-compatibility/2006" xmlns:p14="http://schemas.microsoft.com/office/powerpoint/2010/main">
+    <mc:Choice Requires="p14">
       <p:transition p14:dur="0"/>
     </mc:Choice>
-    <mc:Fallback>
+    <mc:Fallback xmlns="">
       <p:transition xmlns:p14="http://schemas.microsoft.com/office/powerpoint/2010/main"/>
     </mc:Fallback>
   </mc:AlternateContent>
@@ -25779,11 +25793,11 @@
   <p:clrMapOvr>
     <a:masterClrMapping/>
   </p:clrMapOvr>
-  <mc:AlternateContent xmlns:mc="http://schemas.openxmlformats.org/markup-compatibility/2006">
-    <mc:Choice xmlns:p14="http://schemas.microsoft.com/office/powerpoint/2010/main" Requires="p14">
+  <mc:AlternateContent xmlns:mc="http://schemas.openxmlformats.org/markup-compatibility/2006" xmlns:p14="http://schemas.microsoft.com/office/powerpoint/2010/main">
+    <mc:Choice Requires="p14">
       <p:transition p14:dur="0"/>
     </mc:Choice>
-    <mc:Fallback>
+    <mc:Fallback xmlns="">
       <p:transition xmlns:p14="http://schemas.microsoft.com/office/powerpoint/2010/main"/>
     </mc:Fallback>
   </mc:AlternateContent>
@@ -25920,11 +25934,11 @@
   <p:clrMapOvr>
     <a:masterClrMapping/>
   </p:clrMapOvr>
-  <mc:AlternateContent xmlns:mc="http://schemas.openxmlformats.org/markup-compatibility/2006">
-    <mc:Choice xmlns:p14="http://schemas.microsoft.com/office/powerpoint/2010/main" Requires="p14">
+  <mc:AlternateContent xmlns:mc="http://schemas.openxmlformats.org/markup-compatibility/2006" xmlns:p14="http://schemas.microsoft.com/office/powerpoint/2010/main">
+    <mc:Choice Requires="p14">
       <p:transition p14:dur="0"/>
     </mc:Choice>
-    <mc:Fallback>
+    <mc:Fallback xmlns="">
       <p:transition xmlns:p14="http://schemas.microsoft.com/office/powerpoint/2010/main"/>
     </mc:Fallback>
   </mc:AlternateContent>
@@ -25999,8 +26013,8 @@
         </p:nvSpPr>
         <p:spPr bwMode="auto">
           <a:xfrm>
-            <a:off x="1066800" y="2755196"/>
-            <a:ext cx="7010400" cy="1347609"/>
+            <a:off x="762000" y="2755196"/>
+            <a:ext cx="7620000" cy="1347609"/>
           </a:xfrm>
           <a:prstGeom prst="rect">
             <a:avLst/>
@@ -26128,11 +26142,11 @@
   <p:clrMapOvr>
     <a:masterClrMapping/>
   </p:clrMapOvr>
-  <mc:AlternateContent xmlns:mc="http://schemas.openxmlformats.org/markup-compatibility/2006">
-    <mc:Choice xmlns:p14="http://schemas.microsoft.com/office/powerpoint/2010/main" Requires="p14">
+  <mc:AlternateContent xmlns:mc="http://schemas.openxmlformats.org/markup-compatibility/2006" xmlns:p14="http://schemas.microsoft.com/office/powerpoint/2010/main">
+    <mc:Choice Requires="p14">
       <p:transition p14:dur="0"/>
     </mc:Choice>
-    <mc:Fallback>
+    <mc:Fallback xmlns="">
       <p:transition xmlns:p14="http://schemas.microsoft.com/office/powerpoint/2010/main"/>
     </mc:Fallback>
   </mc:AlternateContent>
@@ -26363,11 +26377,11 @@
   <p:clrMapOvr>
     <a:masterClrMapping/>
   </p:clrMapOvr>
-  <mc:AlternateContent xmlns:mc="http://schemas.openxmlformats.org/markup-compatibility/2006">
-    <mc:Choice xmlns:p14="http://schemas.microsoft.com/office/powerpoint/2010/main" Requires="p14">
+  <mc:AlternateContent xmlns:mc="http://schemas.openxmlformats.org/markup-compatibility/2006" xmlns:p14="http://schemas.microsoft.com/office/powerpoint/2010/main">
+    <mc:Choice Requires="p14">
       <p:transition p14:dur="0"/>
     </mc:Choice>
-    <mc:Fallback>
+    <mc:Fallback xmlns="">
       <p:transition xmlns:p14="http://schemas.microsoft.com/office/powerpoint/2010/main"/>
     </mc:Fallback>
   </mc:AlternateContent>
@@ -26462,7 +26476,7 @@
           </a:bodyPr>
           <a:lstStyle/>
           <a:p>
-            <a:pPr defTabSz="803275">
+            <a:pPr algn="ctr" defTabSz="803275">
               <a:buClr>
                 <a:srgbClr val="FF6600"/>
               </a:buClr>
@@ -26491,11 +26505,11 @@
   <p:clrMapOvr>
     <a:masterClrMapping/>
   </p:clrMapOvr>
-  <mc:AlternateContent xmlns:mc="http://schemas.openxmlformats.org/markup-compatibility/2006">
-    <mc:Choice xmlns:p14="http://schemas.microsoft.com/office/powerpoint/2010/main" Requires="p14">
+  <mc:AlternateContent xmlns:mc="http://schemas.openxmlformats.org/markup-compatibility/2006" xmlns:p14="http://schemas.microsoft.com/office/powerpoint/2010/main">
+    <mc:Choice Requires="p14">
       <p:transition p14:dur="0"/>
     </mc:Choice>
-    <mc:Fallback>
+    <mc:Fallback xmlns="">
       <p:transition xmlns:p14="http://schemas.microsoft.com/office/powerpoint/2010/main"/>
     </mc:Fallback>
   </mc:AlternateContent>
@@ -26570,8 +26584,8 @@
         </p:nvSpPr>
         <p:spPr bwMode="auto">
           <a:xfrm>
-            <a:off x="1066800" y="2062698"/>
-            <a:ext cx="7010400" cy="2732604"/>
+            <a:off x="849313" y="2339697"/>
+            <a:ext cx="7445375" cy="2178606"/>
           </a:xfrm>
           <a:prstGeom prst="rect">
             <a:avLst/>
@@ -26669,11 +26683,11 @@
   <p:clrMapOvr>
     <a:masterClrMapping/>
   </p:clrMapOvr>
-  <mc:AlternateContent xmlns:mc="http://schemas.openxmlformats.org/markup-compatibility/2006">
-    <mc:Choice xmlns:p14="http://schemas.microsoft.com/office/powerpoint/2010/main" Requires="p14">
+  <mc:AlternateContent xmlns:mc="http://schemas.openxmlformats.org/markup-compatibility/2006" xmlns:p14="http://schemas.microsoft.com/office/powerpoint/2010/main">
+    <mc:Choice Requires="p14">
       <p:transition p14:dur="0"/>
     </mc:Choice>
-    <mc:Fallback>
+    <mc:Fallback xmlns="">
       <p:transition xmlns:p14="http://schemas.microsoft.com/office/powerpoint/2010/main"/>
     </mc:Fallback>
   </mc:AlternateContent>
@@ -26876,11 +26890,11 @@
   <p:clrMapOvr>
     <a:masterClrMapping/>
   </p:clrMapOvr>
-  <mc:AlternateContent xmlns:mc="http://schemas.openxmlformats.org/markup-compatibility/2006">
-    <mc:Choice xmlns:p14="http://schemas.microsoft.com/office/powerpoint/2010/main" Requires="p14">
+  <mc:AlternateContent xmlns:mc="http://schemas.openxmlformats.org/markup-compatibility/2006" xmlns:p14="http://schemas.microsoft.com/office/powerpoint/2010/main">
+    <mc:Choice Requires="p14">
       <p:transition p14:dur="0"/>
     </mc:Choice>
-    <mc:Fallback>
+    <mc:Fallback xmlns="">
       <p:transition xmlns:p14="http://schemas.microsoft.com/office/powerpoint/2010/main"/>
     </mc:Fallback>
   </mc:AlternateContent>
@@ -27147,11 +27161,11 @@
   <p:clrMapOvr>
     <a:masterClrMapping/>
   </p:clrMapOvr>
-  <mc:AlternateContent xmlns:mc="http://schemas.openxmlformats.org/markup-compatibility/2006">
-    <mc:Choice xmlns:p14="http://schemas.microsoft.com/office/powerpoint/2010/main" Requires="p14">
+  <mc:AlternateContent xmlns:mc="http://schemas.openxmlformats.org/markup-compatibility/2006" xmlns:p14="http://schemas.microsoft.com/office/powerpoint/2010/main">
+    <mc:Choice Requires="p14">
       <p:transition p14:dur="0"/>
     </mc:Choice>
-    <mc:Fallback>
+    <mc:Fallback xmlns="">
       <p:transition xmlns:p14="http://schemas.microsoft.com/office/powerpoint/2010/main"/>
     </mc:Fallback>
   </mc:AlternateContent>

</xml_diff>